<commit_message>
updated data 608 viz
</commit_message>
<xml_diff>
--- a/FALL2025/DATA608/Story7/Story7_Visuals_JohnFerrara.pptx
+++ b/FALL2025/DATA608/Story7/Story7_Visuals_JohnFerrara.pptx
@@ -8,6 +8,7 @@
     <p:sldId id="256" r:id="rId2"/>
     <p:sldId id="257" r:id="rId3"/>
     <p:sldId id="258" r:id="rId4"/>
+    <p:sldId id="259" r:id="rId5"/>
   </p:sldIdLst>
   <p:sldSz cx="12192000" cy="6858000"/>
   <p:notesSz cx="6858000" cy="9144000"/>
@@ -106,6 +107,11 @@
       </a:defRPr>
     </a:lvl9pPr>
   </p:defaultTextStyle>
+  <p:extLst>
+    <p:ext uri="{EFAFB233-063F-42B5-8137-9DF3F51BA10A}">
+      <p15:sldGuideLst xmlns:p15="http://schemas.microsoft.com/office/powerpoint/2012/main"/>
+    </p:ext>
+  </p:extLst>
 </p:presentation>
 </file>
 
@@ -256,7 +262,7 @@
           <a:p>
             <a:fld id="{6C746C5B-94FE-4204-A588-47E9A6D30046}" type="datetimeFigureOut">
               <a:rPr lang="en-US" smtClean="0"/>
-              <a:t>12/5/2025</a:t>
+              <a:t>12/8/2025</a:t>
             </a:fld>
             <a:endParaRPr lang="en-US"/>
           </a:p>
@@ -454,7 +460,7 @@
           <a:p>
             <a:fld id="{6C746C5B-94FE-4204-A588-47E9A6D30046}" type="datetimeFigureOut">
               <a:rPr lang="en-US" smtClean="0"/>
-              <a:t>12/5/2025</a:t>
+              <a:t>12/8/2025</a:t>
             </a:fld>
             <a:endParaRPr lang="en-US"/>
           </a:p>
@@ -662,7 +668,7 @@
           <a:p>
             <a:fld id="{6C746C5B-94FE-4204-A588-47E9A6D30046}" type="datetimeFigureOut">
               <a:rPr lang="en-US" smtClean="0"/>
-              <a:t>12/5/2025</a:t>
+              <a:t>12/8/2025</a:t>
             </a:fld>
             <a:endParaRPr lang="en-US"/>
           </a:p>
@@ -860,7 +866,7 @@
           <a:p>
             <a:fld id="{6C746C5B-94FE-4204-A588-47E9A6D30046}" type="datetimeFigureOut">
               <a:rPr lang="en-US" smtClean="0"/>
-              <a:t>12/5/2025</a:t>
+              <a:t>12/8/2025</a:t>
             </a:fld>
             <a:endParaRPr lang="en-US"/>
           </a:p>
@@ -1135,7 +1141,7 @@
           <a:p>
             <a:fld id="{6C746C5B-94FE-4204-A588-47E9A6D30046}" type="datetimeFigureOut">
               <a:rPr lang="en-US" smtClean="0"/>
-              <a:t>12/5/2025</a:t>
+              <a:t>12/8/2025</a:t>
             </a:fld>
             <a:endParaRPr lang="en-US"/>
           </a:p>
@@ -1400,7 +1406,7 @@
           <a:p>
             <a:fld id="{6C746C5B-94FE-4204-A588-47E9A6D30046}" type="datetimeFigureOut">
               <a:rPr lang="en-US" smtClean="0"/>
-              <a:t>12/5/2025</a:t>
+              <a:t>12/8/2025</a:t>
             </a:fld>
             <a:endParaRPr lang="en-US"/>
           </a:p>
@@ -1812,7 +1818,7 @@
           <a:p>
             <a:fld id="{6C746C5B-94FE-4204-A588-47E9A6D30046}" type="datetimeFigureOut">
               <a:rPr lang="en-US" smtClean="0"/>
-              <a:t>12/5/2025</a:t>
+              <a:t>12/8/2025</a:t>
             </a:fld>
             <a:endParaRPr lang="en-US"/>
           </a:p>
@@ -1953,7 +1959,7 @@
           <a:p>
             <a:fld id="{6C746C5B-94FE-4204-A588-47E9A6D30046}" type="datetimeFigureOut">
               <a:rPr lang="en-US" smtClean="0"/>
-              <a:t>12/5/2025</a:t>
+              <a:t>12/8/2025</a:t>
             </a:fld>
             <a:endParaRPr lang="en-US"/>
           </a:p>
@@ -2066,7 +2072,7 @@
           <a:p>
             <a:fld id="{6C746C5B-94FE-4204-A588-47E9A6D30046}" type="datetimeFigureOut">
               <a:rPr lang="en-US" smtClean="0"/>
-              <a:t>12/5/2025</a:t>
+              <a:t>12/8/2025</a:t>
             </a:fld>
             <a:endParaRPr lang="en-US"/>
           </a:p>
@@ -2377,7 +2383,7 @@
           <a:p>
             <a:fld id="{6C746C5B-94FE-4204-A588-47E9A6D30046}" type="datetimeFigureOut">
               <a:rPr lang="en-US" smtClean="0"/>
-              <a:t>12/5/2025</a:t>
+              <a:t>12/8/2025</a:t>
             </a:fld>
             <a:endParaRPr lang="en-US"/>
           </a:p>
@@ -2665,7 +2671,7 @@
           <a:p>
             <a:fld id="{6C746C5B-94FE-4204-A588-47E9A6D30046}" type="datetimeFigureOut">
               <a:rPr lang="en-US" smtClean="0"/>
-              <a:t>12/5/2025</a:t>
+              <a:t>12/8/2025</a:t>
             </a:fld>
             <a:endParaRPr lang="en-US"/>
           </a:p>
@@ -2906,7 +2912,7 @@
           <a:p>
             <a:fld id="{6C746C5B-94FE-4204-A588-47E9A6D30046}" type="datetimeFigureOut">
               <a:rPr lang="en-US" smtClean="0"/>
-              <a:t>12/5/2025</a:t>
+              <a:t>12/8/2025</a:t>
             </a:fld>
             <a:endParaRPr lang="en-US"/>
           </a:p>
@@ -3518,10 +3524,10 @@
       </p:grpSpPr>
       <p:pic>
         <p:nvPicPr>
-          <p:cNvPr id="6" name="Picture 5" descr="A graph showing a number of countries/regions&#10;&#10;AI-generated content may be incorrect.">
-            <a:extLst>
-              <a:ext uri="{FF2B5EF4-FFF2-40B4-BE49-F238E27FC236}">
-                <a16:creationId xmlns:a16="http://schemas.microsoft.com/office/drawing/2014/main" id="{78146B82-4B28-FC56-2087-241FB471FD78}"/>
+          <p:cNvPr id="3" name="Picture 2" descr="A graph showing a number of different colored bars&#10;&#10;AI-generated content may be incorrect.">
+            <a:extLst>
+              <a:ext uri="{FF2B5EF4-FFF2-40B4-BE49-F238E27FC236}">
+                <a16:creationId xmlns:a16="http://schemas.microsoft.com/office/drawing/2014/main" id="{319A431B-A217-90D1-5099-234CF571B726}"/>
               </a:ext>
             </a:extLst>
           </p:cNvPr>
@@ -3544,8 +3550,8 @@
         </p:blipFill>
         <p:spPr>
           <a:xfrm>
-            <a:off x="623305" y="50285"/>
-            <a:ext cx="10945390" cy="6757429"/>
+            <a:off x="0" y="296215"/>
+            <a:ext cx="12192000" cy="6265569"/>
           </a:xfrm>
           <a:prstGeom prst="rect">
             <a:avLst/>
@@ -3556,6 +3562,72 @@
     <p:extLst>
       <p:ext uri="{BB962C8B-B14F-4D97-AF65-F5344CB8AC3E}">
         <p14:creationId xmlns:p14="http://schemas.microsoft.com/office/powerpoint/2010/main" val="1645041137"/>
+      </p:ext>
+    </p:extLst>
+  </p:cSld>
+  <p:clrMapOvr>
+    <a:masterClrMapping/>
+  </p:clrMapOvr>
+</p:sld>
+</file>
+
+<file path=ppt/slides/slide4.xml><?xml version="1.0" encoding="utf-8"?>
+<p:sld xmlns:a="http://schemas.openxmlformats.org/drawingml/2006/main" xmlns:r="http://schemas.openxmlformats.org/officeDocument/2006/relationships" xmlns:p="http://schemas.openxmlformats.org/presentationml/2006/main">
+  <p:cSld>
+    <p:spTree>
+      <p:nvGrpSpPr>
+        <p:cNvPr id="1" name=""/>
+        <p:cNvGrpSpPr/>
+        <p:nvPr/>
+      </p:nvGrpSpPr>
+      <p:grpSpPr>
+        <a:xfrm>
+          <a:off x="0" y="0"/>
+          <a:ext cx="0" cy="0"/>
+          <a:chOff x="0" y="0"/>
+          <a:chExt cx="0" cy="0"/>
+        </a:xfrm>
+      </p:grpSpPr>
+      <p:pic>
+        <p:nvPicPr>
+          <p:cNvPr id="7" name="Picture 6" descr="A diagram of a diagram&#10;&#10;AI-generated content may be incorrect.">
+            <a:extLst>
+              <a:ext uri="{FF2B5EF4-FFF2-40B4-BE49-F238E27FC236}">
+                <a16:creationId xmlns:a16="http://schemas.microsoft.com/office/drawing/2014/main" id="{58116493-03C5-5C70-0017-8BE32C526291}"/>
+              </a:ext>
+            </a:extLst>
+          </p:cNvPr>
+          <p:cNvPicPr>
+            <a:picLocks noChangeAspect="1"/>
+          </p:cNvPicPr>
+          <p:nvPr/>
+        </p:nvPicPr>
+        <p:blipFill>
+          <a:blip r:embed="rId2">
+            <a:extLst>
+              <a:ext uri="{28A0092B-C50C-407E-A947-70E740481C1C}">
+                <a14:useLocalDpi xmlns:a14="http://schemas.microsoft.com/office/drawing/2010/main" val="0"/>
+              </a:ext>
+            </a:extLst>
+          </a:blip>
+          <a:stretch>
+            <a:fillRect/>
+          </a:stretch>
+        </p:blipFill>
+        <p:spPr>
+          <a:xfrm>
+            <a:off x="920785" y="0"/>
+            <a:ext cx="10350430" cy="6858000"/>
+          </a:xfrm>
+          <a:prstGeom prst="rect">
+            <a:avLst/>
+          </a:prstGeom>
+        </p:spPr>
+      </p:pic>
+    </p:spTree>
+    <p:extLst>
+      <p:ext uri="{BB962C8B-B14F-4D97-AF65-F5344CB8AC3E}">
+        <p14:creationId xmlns:p14="http://schemas.microsoft.com/office/powerpoint/2010/main" val="4143726098"/>
       </p:ext>
     </p:extLst>
   </p:cSld>

</xml_diff>